<commit_message>
slides are prepared, minor updates on baseline
</commit_message>
<xml_diff>
--- a/Slides/Mansur Yeşilbursa.pptx
+++ b/Slides/Mansur Yeşilbursa.pptx
@@ -9,12 +9,15 @@
     <p:sldId id="262" r:id="rId3"/>
     <p:sldId id="263" r:id="rId4"/>
     <p:sldId id="265" r:id="rId5"/>
-    <p:sldId id="264" r:id="rId6"/>
-    <p:sldId id="266" r:id="rId7"/>
-    <p:sldId id="257" r:id="rId8"/>
-    <p:sldId id="258" r:id="rId9"/>
-    <p:sldId id="259" r:id="rId10"/>
-    <p:sldId id="260" r:id="rId11"/>
+    <p:sldId id="267" r:id="rId6"/>
+    <p:sldId id="268" r:id="rId7"/>
+    <p:sldId id="264" r:id="rId8"/>
+    <p:sldId id="266" r:id="rId9"/>
+    <p:sldId id="257" r:id="rId10"/>
+    <p:sldId id="258" r:id="rId11"/>
+    <p:sldId id="259" r:id="rId12"/>
+    <p:sldId id="260" r:id="rId13"/>
+    <p:sldId id="269" r:id="rId14"/>
   </p:sldIdLst>
   <p:sldSz cx="12192000" cy="6858000"/>
   <p:notesSz cx="6858000" cy="9144000"/>
@@ -3981,7 +3984,7 @@
           <a:p>
             <a:r>
               <a:rPr lang="en-US" dirty="0"/>
-              <a:t>Paper 3</a:t>
+              <a:t>Paper 1</a:t>
             </a:r>
           </a:p>
         </p:txBody>
@@ -4014,7 +4017,261 @@
     </p:spTree>
     <p:extLst>
       <p:ext uri="{BB962C8B-B14F-4D97-AF65-F5344CB8AC3E}">
+        <p14:creationId xmlns:p14="http://schemas.microsoft.com/office/powerpoint/2010/main" val="1452545530"/>
+      </p:ext>
+    </p:extLst>
+  </p:cSld>
+  <p:clrMapOvr>
+    <a:masterClrMapping/>
+  </p:clrMapOvr>
+</p:sld>
+</file>
+
+<file path=ppt/slides/slide11.xml><?xml version="1.0" encoding="utf-8"?>
+<p:sld xmlns:a="http://schemas.openxmlformats.org/drawingml/2006/main" xmlns:r="http://schemas.openxmlformats.org/officeDocument/2006/relationships" xmlns:p="http://schemas.openxmlformats.org/presentationml/2006/main">
+  <p:cSld>
+    <p:spTree>
+      <p:nvGrpSpPr>
+        <p:cNvPr id="1" name=""/>
+        <p:cNvGrpSpPr/>
+        <p:nvPr/>
+      </p:nvGrpSpPr>
+      <p:grpSpPr>
+        <a:xfrm>
+          <a:off x="0" y="0"/>
+          <a:ext cx="0" cy="0"/>
+          <a:chOff x="0" y="0"/>
+          <a:chExt cx="0" cy="0"/>
+        </a:xfrm>
+      </p:grpSpPr>
+      <p:sp>
+        <p:nvSpPr>
+          <p:cNvPr id="2" name="Title 1">
+            <a:extLst>
+              <a:ext uri="{FF2B5EF4-FFF2-40B4-BE49-F238E27FC236}">
+                <a16:creationId xmlns:a16="http://schemas.microsoft.com/office/drawing/2014/main" id="{1AE67C95-A1CD-44F8-99D2-4640264C88CA}"/>
+              </a:ext>
+            </a:extLst>
+          </p:cNvPr>
+          <p:cNvSpPr>
+            <a:spLocks noGrp="1"/>
+          </p:cNvSpPr>
+          <p:nvPr>
+            <p:ph type="title"/>
+          </p:nvPr>
+        </p:nvSpPr>
+        <p:spPr/>
+        <p:txBody>
+          <a:bodyPr/>
+          <a:lstStyle/>
+          <a:p>
+            <a:r>
+              <a:rPr lang="en-US" dirty="0"/>
+              <a:t>Paper 2</a:t>
+            </a:r>
+          </a:p>
+        </p:txBody>
+      </p:sp>
+      <p:sp>
+        <p:nvSpPr>
+          <p:cNvPr id="3" name="Content Placeholder 2">
+            <a:extLst>
+              <a:ext uri="{FF2B5EF4-FFF2-40B4-BE49-F238E27FC236}">
+                <a16:creationId xmlns:a16="http://schemas.microsoft.com/office/drawing/2014/main" id="{3B9B51B1-383B-4A8B-9C5B-9FD704B0BC1B}"/>
+              </a:ext>
+            </a:extLst>
+          </p:cNvPr>
+          <p:cNvSpPr>
+            <a:spLocks noGrp="1"/>
+          </p:cNvSpPr>
+          <p:nvPr>
+            <p:ph idx="1"/>
+          </p:nvPr>
+        </p:nvSpPr>
+        <p:spPr/>
+        <p:txBody>
+          <a:bodyPr/>
+          <a:lstStyle/>
+          <a:p>
+            <a:endParaRPr lang="en-US" dirty="0"/>
+          </a:p>
+        </p:txBody>
+      </p:sp>
+    </p:spTree>
+    <p:extLst>
+      <p:ext uri="{BB962C8B-B14F-4D97-AF65-F5344CB8AC3E}">
+        <p14:creationId xmlns:p14="http://schemas.microsoft.com/office/powerpoint/2010/main" val="3961645006"/>
+      </p:ext>
+    </p:extLst>
+  </p:cSld>
+  <p:clrMapOvr>
+    <a:masterClrMapping/>
+  </p:clrMapOvr>
+</p:sld>
+</file>
+
+<file path=ppt/slides/slide12.xml><?xml version="1.0" encoding="utf-8"?>
+<p:sld xmlns:a="http://schemas.openxmlformats.org/drawingml/2006/main" xmlns:r="http://schemas.openxmlformats.org/officeDocument/2006/relationships" xmlns:p="http://schemas.openxmlformats.org/presentationml/2006/main">
+  <p:cSld>
+    <p:spTree>
+      <p:nvGrpSpPr>
+        <p:cNvPr id="1" name=""/>
+        <p:cNvGrpSpPr/>
+        <p:nvPr/>
+      </p:nvGrpSpPr>
+      <p:grpSpPr>
+        <a:xfrm>
+          <a:off x="0" y="0"/>
+          <a:ext cx="0" cy="0"/>
+          <a:chOff x="0" y="0"/>
+          <a:chExt cx="0" cy="0"/>
+        </a:xfrm>
+      </p:grpSpPr>
+      <p:sp>
+        <p:nvSpPr>
+          <p:cNvPr id="2" name="Title 1">
+            <a:extLst>
+              <a:ext uri="{FF2B5EF4-FFF2-40B4-BE49-F238E27FC236}">
+                <a16:creationId xmlns:a16="http://schemas.microsoft.com/office/drawing/2014/main" id="{1AE67C95-A1CD-44F8-99D2-4640264C88CA}"/>
+              </a:ext>
+            </a:extLst>
+          </p:cNvPr>
+          <p:cNvSpPr>
+            <a:spLocks noGrp="1"/>
+          </p:cNvSpPr>
+          <p:nvPr>
+            <p:ph type="title"/>
+          </p:nvPr>
+        </p:nvSpPr>
+        <p:spPr/>
+        <p:txBody>
+          <a:bodyPr/>
+          <a:lstStyle/>
+          <a:p>
+            <a:r>
+              <a:rPr lang="en-US" dirty="0"/>
+              <a:t>Paper 3</a:t>
+            </a:r>
+          </a:p>
+        </p:txBody>
+      </p:sp>
+      <p:sp>
+        <p:nvSpPr>
+          <p:cNvPr id="3" name="Content Placeholder 2">
+            <a:extLst>
+              <a:ext uri="{FF2B5EF4-FFF2-40B4-BE49-F238E27FC236}">
+                <a16:creationId xmlns:a16="http://schemas.microsoft.com/office/drawing/2014/main" id="{3B9B51B1-383B-4A8B-9C5B-9FD704B0BC1B}"/>
+              </a:ext>
+            </a:extLst>
+          </p:cNvPr>
+          <p:cNvSpPr>
+            <a:spLocks noGrp="1"/>
+          </p:cNvSpPr>
+          <p:nvPr>
+            <p:ph idx="1"/>
+          </p:nvPr>
+        </p:nvSpPr>
+        <p:spPr/>
+        <p:txBody>
+          <a:bodyPr/>
+          <a:lstStyle/>
+          <a:p>
+            <a:endParaRPr lang="en-US" dirty="0"/>
+          </a:p>
+        </p:txBody>
+      </p:sp>
+    </p:spTree>
+    <p:extLst>
+      <p:ext uri="{BB962C8B-B14F-4D97-AF65-F5344CB8AC3E}">
         <p14:creationId xmlns:p14="http://schemas.microsoft.com/office/powerpoint/2010/main" val="796136031"/>
+      </p:ext>
+    </p:extLst>
+  </p:cSld>
+  <p:clrMapOvr>
+    <a:masterClrMapping/>
+  </p:clrMapOvr>
+</p:sld>
+</file>
+
+<file path=ppt/slides/slide13.xml><?xml version="1.0" encoding="utf-8"?>
+<p:sld xmlns:a="http://schemas.openxmlformats.org/drawingml/2006/main" xmlns:r="http://schemas.openxmlformats.org/officeDocument/2006/relationships" xmlns:p="http://schemas.openxmlformats.org/presentationml/2006/main">
+  <p:cSld>
+    <p:spTree>
+      <p:nvGrpSpPr>
+        <p:cNvPr id="1" name=""/>
+        <p:cNvGrpSpPr/>
+        <p:nvPr/>
+      </p:nvGrpSpPr>
+      <p:grpSpPr>
+        <a:xfrm>
+          <a:off x="0" y="0"/>
+          <a:ext cx="0" cy="0"/>
+          <a:chOff x="0" y="0"/>
+          <a:chExt cx="0" cy="0"/>
+        </a:xfrm>
+      </p:grpSpPr>
+      <p:sp>
+        <p:nvSpPr>
+          <p:cNvPr id="2" name="Unvan 1"/>
+          <p:cNvSpPr>
+            <a:spLocks noGrp="1"/>
+          </p:cNvSpPr>
+          <p:nvPr>
+            <p:ph type="title"/>
+          </p:nvPr>
+        </p:nvSpPr>
+        <p:spPr/>
+        <p:txBody>
+          <a:bodyPr/>
+          <a:lstStyle/>
+          <a:p>
+            <a:r>
+              <a:rPr lang="tr-TR" dirty="0" err="1" smtClean="0"/>
+              <a:t>References</a:t>
+            </a:r>
+            <a:endParaRPr lang="en-US" dirty="0"/>
+          </a:p>
+        </p:txBody>
+      </p:sp>
+      <p:sp>
+        <p:nvSpPr>
+          <p:cNvPr id="3" name="İçerik Yer Tutucusu 2"/>
+          <p:cNvSpPr>
+            <a:spLocks noGrp="1"/>
+          </p:cNvSpPr>
+          <p:nvPr>
+            <p:ph idx="1"/>
+          </p:nvPr>
+        </p:nvSpPr>
+        <p:spPr/>
+        <p:txBody>
+          <a:bodyPr/>
+          <a:lstStyle/>
+          <a:p>
+            <a:r>
+              <a:rPr lang="tr-TR" dirty="0" smtClean="0"/>
+              <a:t>[1] </a:t>
+            </a:r>
+            <a:r>
+              <a:rPr lang="en-US" dirty="0"/>
+              <a:t>"Abbreviations and acronyms in biomedical research and practice : K to Z", </a:t>
+            </a:r>
+            <a:r>
+              <a:rPr lang="en-US" i="1" dirty="0"/>
+              <a:t>Ufrgs.br</a:t>
+            </a:r>
+            <a:r>
+              <a:rPr lang="en-US" dirty="0"/>
+              <a:t>. [Online]. Available: http://www.ufrgs.br/imunovet/molecular_immunology/abbreviations2.html#k. [Accessed: 09- May- 2020].</a:t>
+            </a:r>
+            <a:endParaRPr lang="en-US" dirty="0"/>
+          </a:p>
+        </p:txBody>
+      </p:sp>
+    </p:spTree>
+    <p:extLst>
+      <p:ext uri="{BB962C8B-B14F-4D97-AF65-F5344CB8AC3E}">
+        <p14:creationId xmlns:p14="http://schemas.microsoft.com/office/powerpoint/2010/main" val="2939589225"/>
       </p:ext>
     </p:extLst>
   </p:cSld>
@@ -4092,7 +4349,35 @@
           <a:p>
             <a:r>
               <a:rPr lang="en-US" dirty="0"/>
-              <a:t>Part 1: Mansur_part_name, Mansur Yeşilbursa</a:t>
+              <a:t>Part 1: </a:t>
+            </a:r>
+            <a:r>
+              <a:rPr lang="tr-TR" dirty="0" err="1" smtClean="0"/>
+              <a:t>Preprocessing</a:t>
+            </a:r>
+            <a:r>
+              <a:rPr lang="tr-TR" dirty="0" smtClean="0"/>
+              <a:t> </a:t>
+            </a:r>
+            <a:r>
+              <a:rPr lang="tr-TR" dirty="0" err="1" smtClean="0"/>
+              <a:t>and</a:t>
+            </a:r>
+            <a:r>
+              <a:rPr lang="tr-TR" dirty="0" smtClean="0"/>
+              <a:t> </a:t>
+            </a:r>
+            <a:r>
+              <a:rPr lang="tr-TR" dirty="0" err="1" smtClean="0"/>
+              <a:t>Baseline</a:t>
+            </a:r>
+            <a:r>
+              <a:rPr lang="en-US" dirty="0" smtClean="0"/>
+              <a:t>, </a:t>
+            </a:r>
+            <a:r>
+              <a:rPr lang="en-US" dirty="0"/>
+              <a:t>Mansur Yeşilbursa</a:t>
             </a:r>
           </a:p>
           <a:p>
@@ -4155,16 +4440,22 @@
             <p:ph type="title"/>
           </p:nvPr>
         </p:nvSpPr>
-        <p:spPr/>
+        <p:spPr>
+          <a:xfrm>
+            <a:off x="1097280" y="286604"/>
+            <a:ext cx="10058400" cy="1067412"/>
+          </a:xfrm>
+        </p:spPr>
         <p:txBody>
           <a:bodyPr/>
           <a:lstStyle/>
           <a:p>
-            <a:r>
-              <a:rPr lang="en-US" dirty="0" err="1"/>
-              <a:t>Mansur_part_name</a:t>
-            </a:r>
-            <a:endParaRPr lang="en-US" dirty="0"/>
+            <a:pPr algn="ctr"/>
+            <a:r>
+              <a:rPr lang="tr-TR" b="1" dirty="0" err="1" smtClean="0"/>
+              <a:t>Preprocessing</a:t>
+            </a:r>
+            <a:endParaRPr lang="en-US" b="1" dirty="0"/>
           </a:p>
         </p:txBody>
       </p:sp>
@@ -4186,35 +4477,384 @@
         </p:nvSpPr>
         <p:spPr/>
         <p:txBody>
-          <a:bodyPr/>
-          <a:lstStyle/>
-          <a:p>
-            <a:r>
-              <a:rPr lang="tr-TR" dirty="0" err="1" smtClean="0"/>
-              <a:t>Abb</a:t>
-            </a:r>
-            <a:r>
-              <a:rPr lang="tr-TR" dirty="0" smtClean="0"/>
-              <a:t> </a:t>
-            </a:r>
-            <a:r>
-              <a:rPr lang="tr-TR" dirty="0" err="1" smtClean="0"/>
-              <a:t>ref</a:t>
-            </a:r>
-            <a:r>
-              <a:rPr lang="tr-TR" smtClean="0"/>
-              <a:t>: </a:t>
-            </a:r>
-            <a:r>
-              <a:rPr lang="tr-TR">
-                <a:hlinkClick r:id="rId2"/>
-              </a:rPr>
-              <a:t>http://www.ufrgs.br/imunovet/molecular_immunology/abbreviations2.html#k</a:t>
-            </a:r>
-            <a:endParaRPr lang="en-US" dirty="0"/>
-          </a:p>
-        </p:txBody>
-      </p:sp>
+          <a:bodyPr>
+            <a:normAutofit/>
+          </a:bodyPr>
+          <a:lstStyle/>
+          <a:p>
+            <a:endParaRPr lang="tr-TR" dirty="0" smtClean="0"/>
+          </a:p>
+          <a:p>
+            <a:pPr lvl="1">
+              <a:lnSpc>
+                <a:spcPct val="150000"/>
+              </a:lnSpc>
+            </a:pPr>
+            <a:r>
+              <a:rPr lang="tr-TR" sz="2400" b="1" dirty="0" err="1" smtClean="0"/>
+              <a:t>Dataset</a:t>
+            </a:r>
+            <a:r>
+              <a:rPr lang="tr-TR" sz="2400" b="1" dirty="0" smtClean="0"/>
+              <a:t> </a:t>
+            </a:r>
+            <a:r>
+              <a:rPr lang="tr-TR" sz="2400" b="1" dirty="0" err="1" smtClean="0"/>
+              <a:t>class</a:t>
+            </a:r>
+            <a:endParaRPr lang="tr-TR" sz="2400" b="1" dirty="0" smtClean="0"/>
+          </a:p>
+          <a:p>
+            <a:pPr lvl="2">
+              <a:lnSpc>
+                <a:spcPct val="150000"/>
+              </a:lnSpc>
+            </a:pPr>
+            <a:r>
+              <a:rPr lang="tr-TR" sz="1800" dirty="0" err="1" smtClean="0"/>
+              <a:t>Processes</a:t>
+            </a:r>
+            <a:r>
+              <a:rPr lang="tr-TR" sz="1800" dirty="0" smtClean="0"/>
+              <a:t> .a1 </a:t>
+            </a:r>
+            <a:r>
+              <a:rPr lang="tr-TR" sz="1800" dirty="0" err="1" smtClean="0"/>
+              <a:t>and</a:t>
+            </a:r>
+            <a:r>
+              <a:rPr lang="tr-TR" sz="1800" dirty="0" smtClean="0"/>
+              <a:t> .a2 </a:t>
+            </a:r>
+            <a:r>
+              <a:rPr lang="tr-TR" sz="1800" dirty="0" err="1" smtClean="0"/>
+              <a:t>files</a:t>
+            </a:r>
+            <a:r>
+              <a:rPr lang="tr-TR" sz="1800" dirty="0" smtClean="0"/>
+              <a:t> in </a:t>
+            </a:r>
+            <a:r>
+              <a:rPr lang="tr-TR" sz="1800" dirty="0" err="1" smtClean="0"/>
+              <a:t>the</a:t>
+            </a:r>
+            <a:r>
+              <a:rPr lang="tr-TR" sz="1800" dirty="0" smtClean="0"/>
+              <a:t> </a:t>
+            </a:r>
+            <a:r>
+              <a:rPr lang="tr-TR" sz="1800" dirty="0" err="1" smtClean="0"/>
+              <a:t>given</a:t>
+            </a:r>
+            <a:r>
+              <a:rPr lang="tr-TR" sz="1800" dirty="0" smtClean="0"/>
+              <a:t> set (</a:t>
+            </a:r>
+            <a:r>
+              <a:rPr lang="tr-TR" sz="1800" dirty="0" err="1" smtClean="0"/>
+              <a:t>train</a:t>
+            </a:r>
+            <a:r>
+              <a:rPr lang="tr-TR" sz="1800" dirty="0" smtClean="0"/>
+              <a:t>, dev </a:t>
+            </a:r>
+            <a:r>
+              <a:rPr lang="tr-TR" sz="1800" dirty="0" err="1" smtClean="0"/>
+              <a:t>or</a:t>
+            </a:r>
+            <a:r>
+              <a:rPr lang="tr-TR" sz="1800" dirty="0" smtClean="0"/>
+              <a:t> test</a:t>
+            </a:r>
+            <a:r>
+              <a:rPr lang="tr-TR" sz="1800" dirty="0" smtClean="0"/>
+              <a:t>)</a:t>
+            </a:r>
+          </a:p>
+          <a:p>
+            <a:pPr lvl="2">
+              <a:lnSpc>
+                <a:spcPct val="150000"/>
+              </a:lnSpc>
+            </a:pPr>
+            <a:r>
+              <a:rPr lang="tr-TR" sz="1800" dirty="0" err="1" smtClean="0"/>
+              <a:t>Stores</a:t>
+            </a:r>
+            <a:r>
+              <a:rPr lang="tr-TR" sz="1800" dirty="0" smtClean="0"/>
+              <a:t> </a:t>
+            </a:r>
+            <a:r>
+              <a:rPr lang="tr-TR" sz="1800" dirty="0" err="1" smtClean="0"/>
+              <a:t>Term</a:t>
+            </a:r>
+            <a:r>
+              <a:rPr lang="tr-TR" sz="1800" dirty="0" smtClean="0"/>
+              <a:t> </a:t>
+            </a:r>
+            <a:r>
+              <a:rPr lang="tr-TR" sz="1800" dirty="0" err="1" smtClean="0"/>
+              <a:t>number-Term</a:t>
+            </a:r>
+            <a:r>
+              <a:rPr lang="tr-TR" sz="1800" dirty="0" smtClean="0"/>
+              <a:t> name </a:t>
+            </a:r>
+            <a:r>
+              <a:rPr lang="tr-TR" sz="1800" dirty="0" err="1" smtClean="0"/>
+              <a:t>tuples</a:t>
+            </a:r>
+            <a:r>
+              <a:rPr lang="tr-TR" sz="1800" dirty="0" smtClean="0"/>
+              <a:t> </a:t>
+            </a:r>
+            <a:r>
+              <a:rPr lang="tr-TR" sz="1800" dirty="0" err="1" smtClean="0"/>
+              <a:t>and</a:t>
+            </a:r>
+            <a:r>
+              <a:rPr lang="tr-TR" sz="1800" dirty="0" smtClean="0"/>
+              <a:t> </a:t>
+            </a:r>
+            <a:r>
+              <a:rPr lang="tr-TR" sz="1800" dirty="0" err="1" smtClean="0"/>
+              <a:t>Term</a:t>
+            </a:r>
+            <a:r>
+              <a:rPr lang="tr-TR" sz="1800" dirty="0" smtClean="0"/>
+              <a:t> </a:t>
+            </a:r>
+            <a:r>
+              <a:rPr lang="tr-TR" sz="1800" dirty="0" err="1" smtClean="0"/>
+              <a:t>number</a:t>
+            </a:r>
+            <a:r>
+              <a:rPr lang="tr-TR" sz="1800" dirty="0" smtClean="0"/>
+              <a:t>-OBT </a:t>
+            </a:r>
+            <a:r>
+              <a:rPr lang="tr-TR" sz="1800" dirty="0" err="1" smtClean="0"/>
+              <a:t>tuples</a:t>
+            </a:r>
+            <a:endParaRPr lang="tr-TR" sz="1800" dirty="0" smtClean="0"/>
+          </a:p>
+          <a:p>
+            <a:pPr lvl="2">
+              <a:lnSpc>
+                <a:spcPct val="150000"/>
+              </a:lnSpc>
+            </a:pPr>
+            <a:r>
+              <a:rPr lang="tr-TR" sz="1800" dirty="0" err="1" smtClean="0"/>
+              <a:t>Stores</a:t>
+            </a:r>
+            <a:r>
+              <a:rPr lang="tr-TR" sz="1800" dirty="0" smtClean="0"/>
+              <a:t> </a:t>
+            </a:r>
+            <a:r>
+              <a:rPr lang="tr-TR" sz="1800" dirty="0" err="1" smtClean="0"/>
+              <a:t>position</a:t>
+            </a:r>
+            <a:r>
+              <a:rPr lang="tr-TR" sz="1800" dirty="0" smtClean="0"/>
+              <a:t> of </a:t>
+            </a:r>
+            <a:r>
+              <a:rPr lang="tr-TR" sz="1800" dirty="0" err="1" smtClean="0"/>
+              <a:t>terms</a:t>
+            </a:r>
+            <a:r>
+              <a:rPr lang="tr-TR" sz="1800" dirty="0" smtClean="0"/>
+              <a:t> in </a:t>
+            </a:r>
+            <a:r>
+              <a:rPr lang="tr-TR" sz="1800" dirty="0" err="1" smtClean="0"/>
+              <a:t>the</a:t>
+            </a:r>
+            <a:r>
+              <a:rPr lang="tr-TR" sz="1800" dirty="0" smtClean="0"/>
+              <a:t> </a:t>
+            </a:r>
+            <a:r>
+              <a:rPr lang="tr-TR" sz="1800" dirty="0" err="1" smtClean="0"/>
+              <a:t>txt</a:t>
+            </a:r>
+            <a:r>
+              <a:rPr lang="tr-TR" sz="1800" dirty="0" smtClean="0"/>
+              <a:t> </a:t>
+            </a:r>
+            <a:r>
+              <a:rPr lang="tr-TR" sz="1800" dirty="0" err="1" smtClean="0"/>
+              <a:t>files</a:t>
+            </a:r>
+            <a:endParaRPr lang="tr-TR" sz="1800" dirty="0" smtClean="0"/>
+          </a:p>
+          <a:p>
+            <a:pPr lvl="2">
+              <a:lnSpc>
+                <a:spcPct val="150000"/>
+              </a:lnSpc>
+            </a:pPr>
+            <a:r>
+              <a:rPr lang="tr-TR" sz="1800" dirty="0" err="1" smtClean="0"/>
+              <a:t>Creates</a:t>
+            </a:r>
+            <a:r>
+              <a:rPr lang="tr-TR" sz="1800" dirty="0" smtClean="0"/>
+              <a:t> a </a:t>
+            </a:r>
+            <a:r>
+              <a:rPr lang="tr-TR" sz="1800" dirty="0" err="1" smtClean="0"/>
+              <a:t>vocabulary</a:t>
+            </a:r>
+            <a:r>
+              <a:rPr lang="tr-TR" sz="1800" dirty="0" smtClean="0"/>
+              <a:t> </a:t>
+            </a:r>
+            <a:r>
+              <a:rPr lang="tr-TR" sz="1800" dirty="0" err="1" smtClean="0"/>
+              <a:t>if</a:t>
+            </a:r>
+            <a:r>
+              <a:rPr lang="tr-TR" sz="1800" dirty="0" smtClean="0"/>
+              <a:t> </a:t>
+            </a:r>
+            <a:r>
+              <a:rPr lang="tr-TR" sz="1800" dirty="0" err="1" smtClean="0"/>
+              <a:t>training</a:t>
+            </a:r>
+            <a:r>
+              <a:rPr lang="tr-TR" sz="1800" dirty="0" smtClean="0"/>
+              <a:t> set is </a:t>
+            </a:r>
+            <a:r>
+              <a:rPr lang="tr-TR" sz="1800" dirty="0" err="1" smtClean="0"/>
+              <a:t>given</a:t>
+            </a:r>
+            <a:endParaRPr lang="tr-TR" sz="1800" dirty="0"/>
+          </a:p>
+          <a:p>
+            <a:pPr lvl="2">
+              <a:lnSpc>
+                <a:spcPct val="150000"/>
+              </a:lnSpc>
+            </a:pPr>
+            <a:r>
+              <a:rPr lang="tr-TR" sz="1800" dirty="0" smtClean="0"/>
+              <a:t>Has </a:t>
+            </a:r>
+            <a:r>
+              <a:rPr lang="tr-TR" sz="1800" dirty="0" err="1" smtClean="0"/>
+              <a:t>access</a:t>
+            </a:r>
+            <a:r>
+              <a:rPr lang="tr-TR" sz="1800" dirty="0" smtClean="0"/>
+              <a:t> </a:t>
+            </a:r>
+            <a:r>
+              <a:rPr lang="tr-TR" sz="1800" dirty="0" err="1" smtClean="0"/>
+              <a:t>to</a:t>
+            </a:r>
+            <a:r>
+              <a:rPr lang="tr-TR" sz="1800" dirty="0" smtClean="0"/>
+              <a:t> </a:t>
+            </a:r>
+            <a:r>
+              <a:rPr lang="tr-TR" sz="1800" dirty="0" err="1" smtClean="0"/>
+              <a:t>Ontology</a:t>
+            </a:r>
+            <a:endParaRPr lang="tr-TR" sz="1800" dirty="0" smtClean="0"/>
+          </a:p>
+          <a:p>
+            <a:pPr lvl="2">
+              <a:lnSpc>
+                <a:spcPct val="150000"/>
+              </a:lnSpc>
+            </a:pPr>
+            <a:r>
+              <a:rPr lang="tr-TR" sz="1800" dirty="0" smtClean="0"/>
+              <a:t>No </a:t>
+            </a:r>
+            <a:r>
+              <a:rPr lang="tr-TR" sz="1800" dirty="0" err="1" smtClean="0"/>
+              <a:t>case-folding</a:t>
+            </a:r>
+            <a:endParaRPr lang="tr-TR" sz="1800" dirty="0" smtClean="0"/>
+          </a:p>
+          <a:p>
+            <a:pPr lvl="2"/>
+            <a:endParaRPr lang="tr-TR" dirty="0" smtClean="0"/>
+          </a:p>
+          <a:p>
+            <a:endParaRPr lang="tr-TR" dirty="0"/>
+          </a:p>
+          <a:p>
+            <a:endParaRPr lang="tr-TR" dirty="0" smtClean="0"/>
+          </a:p>
+          <a:p>
+            <a:endParaRPr lang="tr-TR" dirty="0"/>
+          </a:p>
+          <a:p>
+            <a:endParaRPr lang="tr-TR" dirty="0" smtClean="0"/>
+          </a:p>
+          <a:p>
+            <a:endParaRPr lang="tr-TR" dirty="0"/>
+          </a:p>
+          <a:p>
+            <a:endParaRPr lang="tr-TR" dirty="0" smtClean="0"/>
+          </a:p>
+        </p:txBody>
+      </p:sp>
+      <p:pic>
+        <p:nvPicPr>
+          <p:cNvPr id="4" name="Resim 3"/>
+          <p:cNvPicPr>
+            <a:picLocks noChangeAspect="1"/>
+          </p:cNvPicPr>
+          <p:nvPr/>
+        </p:nvPicPr>
+        <p:blipFill>
+          <a:blip r:embed="rId2"/>
+          <a:stretch>
+            <a:fillRect/>
+          </a:stretch>
+        </p:blipFill>
+        <p:spPr>
+          <a:xfrm>
+            <a:off x="7617055" y="3926863"/>
+            <a:ext cx="4218492" cy="258275"/>
+          </a:xfrm>
+          <a:prstGeom prst="rect">
+            <a:avLst/>
+          </a:prstGeom>
+        </p:spPr>
+      </p:pic>
+      <p:pic>
+        <p:nvPicPr>
+          <p:cNvPr id="5" name="Resim 4"/>
+          <p:cNvPicPr>
+            <a:picLocks noChangeAspect="1"/>
+          </p:cNvPicPr>
+          <p:nvPr/>
+        </p:nvPicPr>
+        <p:blipFill>
+          <a:blip r:embed="rId3"/>
+          <a:stretch>
+            <a:fillRect/>
+          </a:stretch>
+        </p:blipFill>
+        <p:spPr>
+          <a:xfrm>
+            <a:off x="9063166" y="4393587"/>
+            <a:ext cx="1371839" cy="310297"/>
+          </a:xfrm>
+          <a:prstGeom prst="rect">
+            <a:avLst/>
+          </a:prstGeom>
+        </p:spPr>
+      </p:pic>
     </p:spTree>
     <p:extLst>
       <p:ext uri="{BB962C8B-B14F-4D97-AF65-F5344CB8AC3E}">
@@ -4266,11 +4906,20 @@
           <a:bodyPr/>
           <a:lstStyle/>
           <a:p>
-            <a:r>
-              <a:rPr lang="en-US" dirty="0" err="1"/>
-              <a:t>Mansur_part_name</a:t>
-            </a:r>
-            <a:endParaRPr lang="en-US" dirty="0"/>
+            <a:pPr algn="ctr"/>
+            <a:r>
+              <a:rPr lang="tr-TR" b="1" dirty="0" err="1" smtClean="0"/>
+              <a:t>Baseline</a:t>
+            </a:r>
+            <a:r>
+              <a:rPr lang="tr-TR" b="1" dirty="0" smtClean="0"/>
+              <a:t> </a:t>
+            </a:r>
+            <a:r>
+              <a:rPr lang="tr-TR" b="1" dirty="0" err="1" smtClean="0"/>
+              <a:t>System</a:t>
+            </a:r>
+            <a:endParaRPr lang="en-US" b="1" dirty="0"/>
           </a:p>
         </p:txBody>
       </p:sp>
@@ -4295,7 +4944,343 @@
           <a:bodyPr/>
           <a:lstStyle/>
           <a:p>
-            <a:endParaRPr lang="en-US" dirty="0"/>
+            <a:pPr marL="0" indent="0">
+              <a:buNone/>
+            </a:pPr>
+            <a:endParaRPr lang="tr-TR" dirty="0" smtClean="0"/>
+          </a:p>
+          <a:p>
+            <a:pPr lvl="1"/>
+            <a:r>
+              <a:rPr lang="tr-TR" sz="2400" b="1" dirty="0" err="1" smtClean="0"/>
+              <a:t>Exact</a:t>
+            </a:r>
+            <a:r>
+              <a:rPr lang="tr-TR" sz="2400" b="1" dirty="0" smtClean="0"/>
+              <a:t> </a:t>
+            </a:r>
+            <a:r>
+              <a:rPr lang="tr-TR" sz="2400" b="1" dirty="0" err="1" smtClean="0"/>
+              <a:t>Match</a:t>
+            </a:r>
+            <a:endParaRPr lang="tr-TR" sz="2400" b="1" dirty="0" smtClean="0"/>
+          </a:p>
+          <a:p>
+            <a:pPr lvl="2"/>
+            <a:r>
+              <a:rPr lang="tr-TR" sz="1800" b="1" dirty="0" smtClean="0"/>
+              <a:t>On Training Set</a:t>
+            </a:r>
+          </a:p>
+          <a:p>
+            <a:pPr lvl="3"/>
+            <a:r>
+              <a:rPr lang="tr-TR" sz="1800" dirty="0" err="1" smtClean="0"/>
+              <a:t>Searches</a:t>
+            </a:r>
+            <a:r>
+              <a:rPr lang="tr-TR" sz="1800" dirty="0" smtClean="0"/>
+              <a:t> </a:t>
+            </a:r>
+            <a:r>
+              <a:rPr lang="tr-TR" sz="1800" dirty="0" err="1" smtClean="0"/>
+              <a:t>training</a:t>
+            </a:r>
+            <a:r>
+              <a:rPr lang="tr-TR" sz="1800" dirty="0" smtClean="0"/>
+              <a:t> set </a:t>
+            </a:r>
+            <a:r>
+              <a:rPr lang="tr-TR" sz="1800" dirty="0" err="1" smtClean="0"/>
+              <a:t>to</a:t>
+            </a:r>
+            <a:r>
+              <a:rPr lang="tr-TR" sz="1800" dirty="0" smtClean="0"/>
+              <a:t> </a:t>
+            </a:r>
+            <a:r>
+              <a:rPr lang="tr-TR" sz="1800" dirty="0" err="1" smtClean="0"/>
+              <a:t>find</a:t>
+            </a:r>
+            <a:r>
+              <a:rPr lang="tr-TR" sz="1800" dirty="0" smtClean="0"/>
+              <a:t> </a:t>
+            </a:r>
+            <a:r>
+              <a:rPr lang="tr-TR" sz="1800" dirty="0" err="1" smtClean="0"/>
+              <a:t>exact</a:t>
+            </a:r>
+            <a:r>
+              <a:rPr lang="tr-TR" sz="1800" dirty="0"/>
+              <a:t> </a:t>
+            </a:r>
+            <a:r>
+              <a:rPr lang="tr-TR" sz="1800" dirty="0" err="1" smtClean="0"/>
+              <a:t>entity</a:t>
+            </a:r>
+            <a:r>
+              <a:rPr lang="tr-TR" sz="1800" dirty="0" smtClean="0"/>
+              <a:t> </a:t>
+            </a:r>
+            <a:r>
+              <a:rPr lang="tr-TR" sz="1800" dirty="0" err="1" smtClean="0"/>
+              <a:t>match</a:t>
+            </a:r>
+            <a:endParaRPr lang="tr-TR" sz="1800" dirty="0" smtClean="0"/>
+          </a:p>
+          <a:p>
+            <a:pPr lvl="3"/>
+            <a:r>
+              <a:rPr lang="tr-TR" sz="1800" dirty="0" err="1" smtClean="0"/>
+              <a:t>If</a:t>
+            </a:r>
+            <a:r>
+              <a:rPr lang="tr-TR" sz="1800" dirty="0" smtClean="0"/>
+              <a:t> </a:t>
+            </a:r>
+            <a:r>
+              <a:rPr lang="tr-TR" sz="1800" dirty="0" err="1" smtClean="0"/>
+              <a:t>finds</a:t>
+            </a:r>
+            <a:r>
+              <a:rPr lang="tr-TR" sz="1800" dirty="0" smtClean="0"/>
+              <a:t>, </a:t>
+            </a:r>
+            <a:r>
+              <a:rPr lang="tr-TR" sz="1800" dirty="0" err="1" smtClean="0"/>
+              <a:t>retrieves</a:t>
+            </a:r>
+            <a:r>
+              <a:rPr lang="tr-TR" sz="1800" dirty="0" smtClean="0"/>
+              <a:t> OBT of </a:t>
+            </a:r>
+            <a:r>
+              <a:rPr lang="tr-TR" sz="1800" dirty="0" err="1" smtClean="0"/>
+              <a:t>the</a:t>
+            </a:r>
+            <a:r>
+              <a:rPr lang="tr-TR" sz="1800" dirty="0" smtClean="0"/>
+              <a:t> </a:t>
+            </a:r>
+            <a:r>
+              <a:rPr lang="tr-TR" sz="1800" dirty="0" err="1" smtClean="0"/>
+              <a:t>matched</a:t>
+            </a:r>
+            <a:r>
+              <a:rPr lang="tr-TR" sz="1800" dirty="0" smtClean="0"/>
+              <a:t> </a:t>
+            </a:r>
+            <a:r>
+              <a:rPr lang="tr-TR" sz="1800" dirty="0" err="1" smtClean="0"/>
+              <a:t>entity</a:t>
+            </a:r>
+            <a:endParaRPr lang="tr-TR" sz="1800" dirty="0" smtClean="0"/>
+          </a:p>
+          <a:p>
+            <a:pPr lvl="3"/>
+            <a:r>
+              <a:rPr lang="tr-TR" sz="1800" b="1" dirty="0" err="1" smtClean="0"/>
+              <a:t>Performance</a:t>
+            </a:r>
+            <a:r>
+              <a:rPr lang="tr-TR" sz="1800" dirty="0" smtClean="0"/>
+              <a:t>: 22% </a:t>
+            </a:r>
+            <a:r>
+              <a:rPr lang="tr-TR" sz="1800" dirty="0" err="1" smtClean="0"/>
+              <a:t>correct</a:t>
+            </a:r>
+            <a:r>
+              <a:rPr lang="tr-TR" sz="1800" dirty="0" smtClean="0"/>
+              <a:t> </a:t>
+            </a:r>
+            <a:r>
+              <a:rPr lang="tr-TR" sz="1800" dirty="0" err="1" smtClean="0"/>
+              <a:t>normalization</a:t>
+            </a:r>
+            <a:r>
+              <a:rPr lang="tr-TR" sz="1800" dirty="0" smtClean="0"/>
+              <a:t> on dev set</a:t>
+            </a:r>
+            <a:endParaRPr lang="tr-TR" sz="1800" dirty="0"/>
+          </a:p>
+          <a:p>
+            <a:pPr lvl="2"/>
+            <a:r>
+              <a:rPr lang="tr-TR" sz="1800" b="1" dirty="0" smtClean="0"/>
+              <a:t>On </a:t>
+            </a:r>
+            <a:r>
+              <a:rPr lang="tr-TR" sz="1800" b="1" dirty="0" err="1" smtClean="0"/>
+              <a:t>Ontology</a:t>
+            </a:r>
+            <a:endParaRPr lang="tr-TR" sz="1800" b="1" dirty="0" smtClean="0"/>
+          </a:p>
+          <a:p>
+            <a:pPr lvl="3"/>
+            <a:r>
+              <a:rPr lang="tr-TR" sz="1800" dirty="0" err="1" smtClean="0"/>
+              <a:t>Searches</a:t>
+            </a:r>
+            <a:r>
+              <a:rPr lang="tr-TR" sz="1800" dirty="0" smtClean="0"/>
+              <a:t> </a:t>
+            </a:r>
+            <a:r>
+              <a:rPr lang="tr-TR" sz="1800" dirty="0" err="1" smtClean="0"/>
+              <a:t>Ontology</a:t>
+            </a:r>
+            <a:r>
+              <a:rPr lang="tr-TR" sz="1800" dirty="0" smtClean="0"/>
+              <a:t> file </a:t>
+            </a:r>
+            <a:r>
+              <a:rPr lang="tr-TR" sz="1800" dirty="0" err="1" smtClean="0"/>
+              <a:t>to</a:t>
+            </a:r>
+            <a:r>
+              <a:rPr lang="tr-TR" sz="1800" dirty="0" smtClean="0"/>
+              <a:t> </a:t>
+            </a:r>
+            <a:r>
+              <a:rPr lang="tr-TR" sz="1800" dirty="0" err="1" smtClean="0"/>
+              <a:t>find</a:t>
+            </a:r>
+            <a:r>
+              <a:rPr lang="tr-TR" sz="1800" dirty="0" smtClean="0"/>
+              <a:t> </a:t>
+            </a:r>
+            <a:r>
+              <a:rPr lang="tr-TR" sz="1800" dirty="0" err="1" smtClean="0"/>
+              <a:t>exact</a:t>
+            </a:r>
+            <a:r>
+              <a:rPr lang="tr-TR" sz="1800" dirty="0" smtClean="0"/>
+              <a:t> </a:t>
+            </a:r>
+            <a:r>
+              <a:rPr lang="tr-TR" sz="1800" dirty="0" err="1" smtClean="0"/>
+              <a:t>entity</a:t>
+            </a:r>
+            <a:r>
+              <a:rPr lang="tr-TR" sz="1800" dirty="0" smtClean="0"/>
+              <a:t> </a:t>
+            </a:r>
+            <a:r>
+              <a:rPr lang="tr-TR" sz="1800" dirty="0" err="1" smtClean="0"/>
+              <a:t>match</a:t>
+            </a:r>
+            <a:endParaRPr lang="tr-TR" sz="1800" dirty="0" smtClean="0"/>
+          </a:p>
+          <a:p>
+            <a:pPr lvl="3"/>
+            <a:r>
+              <a:rPr lang="tr-TR" sz="1800" dirty="0" err="1"/>
+              <a:t>If</a:t>
+            </a:r>
+            <a:r>
+              <a:rPr lang="tr-TR" sz="1800" dirty="0"/>
+              <a:t> </a:t>
+            </a:r>
+            <a:r>
+              <a:rPr lang="tr-TR" sz="1800" dirty="0" err="1"/>
+              <a:t>finds</a:t>
+            </a:r>
+            <a:r>
+              <a:rPr lang="tr-TR" sz="1800" dirty="0"/>
+              <a:t>, </a:t>
+            </a:r>
+            <a:r>
+              <a:rPr lang="tr-TR" sz="1800" dirty="0" err="1"/>
+              <a:t>retrieves</a:t>
+            </a:r>
+            <a:r>
+              <a:rPr lang="tr-TR" sz="1800" dirty="0"/>
+              <a:t> OBT of </a:t>
+            </a:r>
+            <a:r>
+              <a:rPr lang="tr-TR" sz="1800" dirty="0" err="1"/>
+              <a:t>the</a:t>
+            </a:r>
+            <a:r>
+              <a:rPr lang="tr-TR" sz="1800" dirty="0"/>
+              <a:t> </a:t>
+            </a:r>
+            <a:r>
+              <a:rPr lang="tr-TR" sz="1800" dirty="0" err="1"/>
+              <a:t>matched</a:t>
+            </a:r>
+            <a:r>
+              <a:rPr lang="tr-TR" sz="1800" dirty="0"/>
+              <a:t> </a:t>
+            </a:r>
+            <a:r>
+              <a:rPr lang="tr-TR" sz="1800" dirty="0" err="1"/>
+              <a:t>entity</a:t>
+            </a:r>
+            <a:endParaRPr lang="tr-TR" sz="1800" dirty="0"/>
+          </a:p>
+          <a:p>
+            <a:pPr lvl="3"/>
+            <a:r>
+              <a:rPr lang="tr-TR" sz="1800" dirty="0" err="1" smtClean="0"/>
+              <a:t>Improved</a:t>
+            </a:r>
+            <a:r>
+              <a:rPr lang="tr-TR" sz="1800" dirty="0" smtClean="0"/>
+              <a:t> </a:t>
+            </a:r>
+            <a:r>
+              <a:rPr lang="tr-TR" sz="1800" dirty="0" err="1" smtClean="0"/>
+              <a:t>performance</a:t>
+            </a:r>
+            <a:r>
+              <a:rPr lang="tr-TR" sz="1800" dirty="0" smtClean="0"/>
+              <a:t> </a:t>
+            </a:r>
+            <a:r>
+              <a:rPr lang="tr-TR" sz="1800" dirty="0" err="1" smtClean="0"/>
+              <a:t>by</a:t>
+            </a:r>
+            <a:r>
+              <a:rPr lang="tr-TR" sz="1800" dirty="0" smtClean="0"/>
+              <a:t> 11%</a:t>
+            </a:r>
+          </a:p>
+          <a:p>
+            <a:pPr lvl="3"/>
+            <a:r>
+              <a:rPr lang="tr-TR" sz="1800" b="1" dirty="0" err="1" smtClean="0"/>
+              <a:t>Performance</a:t>
+            </a:r>
+            <a:r>
+              <a:rPr lang="tr-TR" sz="1800" dirty="0" smtClean="0"/>
+              <a:t>: </a:t>
+            </a:r>
+            <a:r>
+              <a:rPr lang="tr-TR" sz="1800" dirty="0" smtClean="0"/>
+              <a:t>33% </a:t>
+            </a:r>
+            <a:r>
+              <a:rPr lang="tr-TR" sz="1800" dirty="0" err="1" smtClean="0"/>
+              <a:t>correct</a:t>
+            </a:r>
+            <a:r>
+              <a:rPr lang="tr-TR" sz="1800" dirty="0" smtClean="0"/>
+              <a:t> </a:t>
+            </a:r>
+            <a:r>
+              <a:rPr lang="tr-TR" sz="1800" dirty="0" err="1" smtClean="0"/>
+              <a:t>normalization</a:t>
+            </a:r>
+            <a:r>
+              <a:rPr lang="tr-TR" sz="1800" dirty="0" smtClean="0"/>
+              <a:t> on dev set</a:t>
+            </a:r>
+          </a:p>
+          <a:p>
+            <a:pPr lvl="3"/>
+            <a:endParaRPr lang="tr-TR" sz="1600" dirty="0"/>
           </a:p>
         </p:txBody>
       </p:sp>
@@ -4331,13 +5316,7 @@
       </p:grpSpPr>
       <p:sp>
         <p:nvSpPr>
-          <p:cNvPr id="2" name="Title 1">
-            <a:extLst>
-              <a:ext uri="{FF2B5EF4-FFF2-40B4-BE49-F238E27FC236}">
-                <a16:creationId xmlns:a16="http://schemas.microsoft.com/office/drawing/2014/main" id="{369CA4F0-7F76-4DC7-A47D-BD061E0C6AF6}"/>
-              </a:ext>
-            </a:extLst>
-          </p:cNvPr>
+          <p:cNvPr id="2" name="Unvan 1"/>
           <p:cNvSpPr>
             <a:spLocks noGrp="1"/>
           </p:cNvSpPr>
@@ -4350,23 +5329,26 @@
           <a:bodyPr/>
           <a:lstStyle/>
           <a:p>
-            <a:r>
-              <a:rPr lang="en-US" dirty="0" err="1"/>
-              <a:t>Abdullah_part_name</a:t>
-            </a:r>
-            <a:endParaRPr lang="en-US" dirty="0"/>
-          </a:p>
-        </p:txBody>
-      </p:sp>
-      <p:sp>
-        <p:nvSpPr>
-          <p:cNvPr id="3" name="Content Placeholder 2">
-            <a:extLst>
-              <a:ext uri="{FF2B5EF4-FFF2-40B4-BE49-F238E27FC236}">
-                <a16:creationId xmlns:a16="http://schemas.microsoft.com/office/drawing/2014/main" id="{D941672E-CF5C-4625-8693-307F29A99472}"/>
-              </a:ext>
-            </a:extLst>
-          </p:cNvPr>
+            <a:pPr algn="ctr"/>
+            <a:r>
+              <a:rPr lang="tr-TR" b="1" dirty="0" err="1" smtClean="0"/>
+              <a:t>Baseline</a:t>
+            </a:r>
+            <a:r>
+              <a:rPr lang="tr-TR" b="1" dirty="0" smtClean="0"/>
+              <a:t> </a:t>
+            </a:r>
+            <a:r>
+              <a:rPr lang="tr-TR" b="1" dirty="0" err="1" smtClean="0"/>
+              <a:t>System</a:t>
+            </a:r>
+            <a:endParaRPr lang="en-US" b="1" dirty="0"/>
+          </a:p>
+        </p:txBody>
+      </p:sp>
+      <p:sp>
+        <p:nvSpPr>
+          <p:cNvPr id="3" name="İçerik Yer Tutucusu 2"/>
           <p:cNvSpPr>
             <a:spLocks noGrp="1"/>
           </p:cNvSpPr>
@@ -4374,19 +5356,455 @@
             <p:ph idx="1"/>
           </p:nvPr>
         </p:nvSpPr>
-        <p:spPr/>
-        <p:txBody>
-          <a:bodyPr/>
-          <a:lstStyle/>
-          <a:p>
-            <a:endParaRPr lang="en-US" dirty="0"/>
+        <p:spPr>
+          <a:xfrm>
+            <a:off x="1097280" y="1845734"/>
+            <a:ext cx="10058400" cy="4431974"/>
+          </a:xfrm>
+        </p:spPr>
+        <p:txBody>
+          <a:bodyPr>
+            <a:normAutofit/>
+          </a:bodyPr>
+          <a:lstStyle/>
+          <a:p>
+            <a:pPr lvl="1">
+              <a:lnSpc>
+                <a:spcPct val="100000"/>
+              </a:lnSpc>
+            </a:pPr>
+            <a:r>
+              <a:rPr lang="tr-TR" sz="2400" b="1" dirty="0" err="1" smtClean="0"/>
+              <a:t>Exact</a:t>
+            </a:r>
+            <a:r>
+              <a:rPr lang="tr-TR" sz="2400" b="1" dirty="0" smtClean="0"/>
+              <a:t> </a:t>
+            </a:r>
+            <a:r>
+              <a:rPr lang="tr-TR" sz="2400" b="1" dirty="0" err="1" smtClean="0"/>
+              <a:t>Match</a:t>
+            </a:r>
+            <a:endParaRPr lang="tr-TR" sz="2400" b="1" dirty="0" smtClean="0"/>
+          </a:p>
+          <a:p>
+            <a:pPr lvl="2">
+              <a:lnSpc>
+                <a:spcPct val="100000"/>
+              </a:lnSpc>
+            </a:pPr>
+            <a:r>
+              <a:rPr lang="tr-TR" sz="1800" b="1" dirty="0" err="1" smtClean="0"/>
+              <a:t>Lemmazation</a:t>
+            </a:r>
+            <a:endParaRPr lang="tr-TR" sz="1800" b="1" dirty="0" smtClean="0"/>
+          </a:p>
+          <a:p>
+            <a:pPr lvl="3">
+              <a:lnSpc>
+                <a:spcPct val="100000"/>
+              </a:lnSpc>
+            </a:pPr>
+            <a:r>
+              <a:rPr lang="tr-TR" sz="1800" dirty="0" err="1" smtClean="0"/>
+              <a:t>For</a:t>
+            </a:r>
+            <a:r>
+              <a:rPr lang="tr-TR" sz="1800" dirty="0" smtClean="0"/>
+              <a:t> </a:t>
+            </a:r>
+            <a:r>
+              <a:rPr lang="tr-TR" sz="1800" dirty="0" err="1" smtClean="0"/>
+              <a:t>given</a:t>
+            </a:r>
+            <a:r>
+              <a:rPr lang="tr-TR" sz="1800" dirty="0" smtClean="0"/>
+              <a:t> test </a:t>
+            </a:r>
+            <a:r>
+              <a:rPr lang="tr-TR" sz="1800" dirty="0" err="1" smtClean="0"/>
+              <a:t>entities</a:t>
+            </a:r>
+            <a:r>
+              <a:rPr lang="tr-TR" sz="1800" dirty="0" smtClean="0"/>
+              <a:t>, </a:t>
+            </a:r>
+            <a:r>
+              <a:rPr lang="tr-TR" sz="1800" dirty="0" err="1" smtClean="0"/>
+              <a:t>lemmazation</a:t>
+            </a:r>
+            <a:r>
+              <a:rPr lang="tr-TR" sz="1800" dirty="0" smtClean="0"/>
+              <a:t> is </a:t>
+            </a:r>
+            <a:r>
+              <a:rPr lang="tr-TR" sz="1800" dirty="0" err="1" smtClean="0"/>
+              <a:t>applied</a:t>
+            </a:r>
+            <a:endParaRPr lang="tr-TR" sz="1800" dirty="0" smtClean="0"/>
+          </a:p>
+          <a:p>
+            <a:pPr lvl="3">
+              <a:lnSpc>
+                <a:spcPct val="100000"/>
+              </a:lnSpc>
+            </a:pPr>
+            <a:r>
+              <a:rPr lang="tr-TR" sz="1800" dirty="0" err="1" smtClean="0"/>
+              <a:t>If</a:t>
+            </a:r>
+            <a:r>
+              <a:rPr lang="tr-TR" sz="1800" dirty="0" smtClean="0"/>
+              <a:t> </a:t>
+            </a:r>
+            <a:r>
+              <a:rPr lang="tr-TR" sz="1800" dirty="0" err="1" smtClean="0"/>
+              <a:t>lemmatized</a:t>
+            </a:r>
+            <a:r>
+              <a:rPr lang="tr-TR" sz="1800" dirty="0" smtClean="0"/>
+              <a:t> </a:t>
+            </a:r>
+            <a:r>
+              <a:rPr lang="tr-TR" sz="1800" dirty="0" err="1" smtClean="0"/>
+              <a:t>entity</a:t>
+            </a:r>
+            <a:r>
+              <a:rPr lang="tr-TR" sz="1800" dirty="0" smtClean="0"/>
+              <a:t> is </a:t>
+            </a:r>
+            <a:r>
+              <a:rPr lang="tr-TR" sz="1800" dirty="0" err="1" smtClean="0"/>
+              <a:t>different</a:t>
+            </a:r>
+            <a:r>
+              <a:rPr lang="tr-TR" sz="1800" dirty="0" smtClean="0"/>
+              <a:t> </a:t>
+            </a:r>
+            <a:r>
+              <a:rPr lang="tr-TR" sz="1800" dirty="0" err="1" smtClean="0"/>
+              <a:t>than</a:t>
+            </a:r>
+            <a:r>
+              <a:rPr lang="tr-TR" sz="1800" dirty="0" smtClean="0"/>
+              <a:t> </a:t>
+            </a:r>
+            <a:r>
+              <a:rPr lang="tr-TR" sz="1800" dirty="0" err="1" smtClean="0"/>
+              <a:t>original</a:t>
+            </a:r>
+            <a:r>
+              <a:rPr lang="tr-TR" sz="1800" dirty="0" smtClean="0"/>
+              <a:t> </a:t>
+            </a:r>
+            <a:r>
+              <a:rPr lang="tr-TR" sz="1800" dirty="0" err="1" smtClean="0"/>
+              <a:t>entity</a:t>
+            </a:r>
+            <a:endParaRPr lang="tr-TR" sz="1800" dirty="0"/>
+          </a:p>
+          <a:p>
+            <a:pPr lvl="4">
+              <a:lnSpc>
+                <a:spcPct val="100000"/>
+              </a:lnSpc>
+            </a:pPr>
+            <a:r>
+              <a:rPr lang="tr-TR" sz="1800" dirty="0" err="1" smtClean="0"/>
+              <a:t>Searches</a:t>
+            </a:r>
+            <a:r>
+              <a:rPr lang="tr-TR" sz="1800" dirty="0" smtClean="0"/>
+              <a:t> </a:t>
+            </a:r>
+            <a:r>
+              <a:rPr lang="tr-TR" sz="1800" dirty="0" err="1" smtClean="0"/>
+              <a:t>for</a:t>
+            </a:r>
+            <a:r>
+              <a:rPr lang="tr-TR" sz="1800" dirty="0" smtClean="0"/>
+              <a:t> </a:t>
+            </a:r>
+            <a:r>
+              <a:rPr lang="tr-TR" sz="1800" dirty="0" err="1" smtClean="0"/>
+              <a:t>both</a:t>
+            </a:r>
+            <a:r>
+              <a:rPr lang="tr-TR" sz="1800" dirty="0" smtClean="0"/>
+              <a:t> </a:t>
+            </a:r>
+            <a:r>
+              <a:rPr lang="tr-TR" sz="1800" dirty="0" err="1" smtClean="0"/>
+              <a:t>terms</a:t>
+            </a:r>
+            <a:r>
+              <a:rPr lang="tr-TR" sz="1800" dirty="0" smtClean="0"/>
+              <a:t> in Training set </a:t>
+            </a:r>
+            <a:r>
+              <a:rPr lang="tr-TR" sz="1800" dirty="0" err="1" smtClean="0"/>
+              <a:t>and</a:t>
+            </a:r>
+            <a:r>
+              <a:rPr lang="tr-TR" sz="1800" dirty="0" smtClean="0"/>
+              <a:t> </a:t>
+            </a:r>
+            <a:r>
+              <a:rPr lang="tr-TR" sz="1800" dirty="0" err="1" smtClean="0"/>
+              <a:t>Ontology</a:t>
+            </a:r>
+            <a:endParaRPr lang="tr-TR" sz="1800" dirty="0" smtClean="0"/>
+          </a:p>
+          <a:p>
+            <a:pPr lvl="3">
+              <a:lnSpc>
+                <a:spcPct val="100000"/>
+              </a:lnSpc>
+            </a:pPr>
+            <a:r>
+              <a:rPr lang="tr-TR" sz="1800" dirty="0" err="1" smtClean="0"/>
+              <a:t>Improved</a:t>
+            </a:r>
+            <a:r>
+              <a:rPr lang="tr-TR" sz="1800" dirty="0" smtClean="0"/>
+              <a:t> </a:t>
+            </a:r>
+            <a:r>
+              <a:rPr lang="tr-TR" sz="1800" dirty="0" err="1" smtClean="0"/>
+              <a:t>performance</a:t>
+            </a:r>
+            <a:r>
+              <a:rPr lang="tr-TR" sz="1800" dirty="0" smtClean="0"/>
+              <a:t> </a:t>
+            </a:r>
+            <a:r>
+              <a:rPr lang="tr-TR" sz="1800" dirty="0" err="1" smtClean="0"/>
+              <a:t>by</a:t>
+            </a:r>
+            <a:r>
+              <a:rPr lang="tr-TR" sz="1800" dirty="0" smtClean="0"/>
+              <a:t> 4% </a:t>
+            </a:r>
+          </a:p>
+          <a:p>
+            <a:pPr lvl="3">
+              <a:lnSpc>
+                <a:spcPct val="100000"/>
+              </a:lnSpc>
+            </a:pPr>
+            <a:r>
+              <a:rPr lang="tr-TR" sz="1800" b="1" dirty="0" err="1" smtClean="0"/>
+              <a:t>Performance</a:t>
+            </a:r>
+            <a:r>
+              <a:rPr lang="tr-TR" sz="1800" b="1" dirty="0" smtClean="0"/>
+              <a:t>: </a:t>
+            </a:r>
+            <a:r>
+              <a:rPr lang="tr-TR" sz="1800" dirty="0" smtClean="0"/>
+              <a:t>37%  </a:t>
+            </a:r>
+            <a:r>
+              <a:rPr lang="tr-TR" sz="1800" dirty="0" err="1" smtClean="0"/>
+              <a:t>correct</a:t>
+            </a:r>
+            <a:r>
+              <a:rPr lang="tr-TR" sz="1800" dirty="0" smtClean="0"/>
+              <a:t> </a:t>
+            </a:r>
+            <a:r>
+              <a:rPr lang="tr-TR" sz="1800" dirty="0" err="1" smtClean="0"/>
+              <a:t>normalization</a:t>
+            </a:r>
+            <a:r>
+              <a:rPr lang="tr-TR" sz="1800" dirty="0" smtClean="0"/>
+              <a:t> in dev set</a:t>
+            </a:r>
+          </a:p>
+          <a:p>
+            <a:pPr lvl="2">
+              <a:lnSpc>
+                <a:spcPct val="100000"/>
+              </a:lnSpc>
+            </a:pPr>
+            <a:r>
+              <a:rPr lang="tr-TR" sz="1800" b="1" dirty="0" err="1" smtClean="0"/>
+              <a:t>Abbreviation</a:t>
+            </a:r>
+            <a:r>
+              <a:rPr lang="tr-TR" sz="1800" b="1" dirty="0" smtClean="0"/>
+              <a:t> </a:t>
+            </a:r>
+            <a:r>
+              <a:rPr lang="tr-TR" sz="1800" b="1" dirty="0" err="1" smtClean="0"/>
+              <a:t>Resolution</a:t>
+            </a:r>
+            <a:endParaRPr lang="tr-TR" sz="1800" b="1" dirty="0" smtClean="0"/>
+          </a:p>
+          <a:p>
+            <a:pPr lvl="3">
+              <a:lnSpc>
+                <a:spcPct val="100000"/>
+              </a:lnSpc>
+            </a:pPr>
+            <a:r>
+              <a:rPr lang="tr-TR" sz="1800" dirty="0" err="1" smtClean="0"/>
+              <a:t>Requires</a:t>
+            </a:r>
+            <a:r>
+              <a:rPr lang="tr-TR" sz="1800" dirty="0" smtClean="0"/>
+              <a:t> a </a:t>
+            </a:r>
+            <a:r>
+              <a:rPr lang="tr-TR" sz="1800" dirty="0" err="1" smtClean="0"/>
+              <a:t>comprehensive</a:t>
+            </a:r>
+            <a:r>
+              <a:rPr lang="tr-TR" sz="1800" dirty="0" smtClean="0"/>
+              <a:t> </a:t>
+            </a:r>
+            <a:r>
+              <a:rPr lang="tr-TR" sz="1800" dirty="0" err="1" smtClean="0"/>
+              <a:t>Biomedical</a:t>
+            </a:r>
+            <a:r>
+              <a:rPr lang="tr-TR" sz="1800" dirty="0" smtClean="0"/>
+              <a:t> </a:t>
+            </a:r>
+            <a:r>
+              <a:rPr lang="tr-TR" sz="1800" dirty="0" err="1" smtClean="0"/>
+              <a:t>Abbreviation</a:t>
+            </a:r>
+            <a:r>
+              <a:rPr lang="tr-TR" sz="1800" dirty="0" smtClean="0"/>
+              <a:t> Database</a:t>
+            </a:r>
+          </a:p>
+          <a:p>
+            <a:pPr lvl="3">
+              <a:lnSpc>
+                <a:spcPct val="100000"/>
+              </a:lnSpc>
+            </a:pPr>
+            <a:r>
+              <a:rPr lang="tr-TR" sz="1800" dirty="0" err="1" smtClean="0"/>
+              <a:t>One</a:t>
+            </a:r>
+            <a:r>
+              <a:rPr lang="tr-TR" sz="1800" dirty="0" smtClean="0"/>
+              <a:t> </a:t>
+            </a:r>
+            <a:r>
+              <a:rPr lang="tr-TR" sz="1800" dirty="0" err="1" smtClean="0"/>
+              <a:t>that</a:t>
+            </a:r>
+            <a:r>
+              <a:rPr lang="tr-TR" sz="1800" dirty="0" smtClean="0"/>
+              <a:t> is </a:t>
+            </a:r>
+            <a:r>
+              <a:rPr lang="tr-TR" sz="1800" dirty="0" err="1" smtClean="0"/>
+              <a:t>used</a:t>
+            </a:r>
+            <a:r>
+              <a:rPr lang="tr-TR" sz="1800" dirty="0" smtClean="0"/>
+              <a:t> </a:t>
+            </a:r>
+            <a:r>
+              <a:rPr lang="tr-TR" sz="1800" dirty="0" err="1" smtClean="0"/>
+              <a:t>was</a:t>
+            </a:r>
+            <a:r>
+              <a:rPr lang="tr-TR" sz="1800" dirty="0" smtClean="0"/>
+              <a:t> </a:t>
+            </a:r>
+            <a:r>
+              <a:rPr lang="tr-TR" sz="1800" dirty="0" err="1" smtClean="0"/>
+              <a:t>messy</a:t>
+            </a:r>
+            <a:r>
+              <a:rPr lang="tr-TR" sz="1800" dirty="0" smtClean="0"/>
+              <a:t> </a:t>
+            </a:r>
+            <a:r>
+              <a:rPr lang="tr-TR" sz="1800" dirty="0" err="1" smtClean="0"/>
+              <a:t>and</a:t>
+            </a:r>
+            <a:r>
+              <a:rPr lang="tr-TR" sz="1800" dirty="0" smtClean="0"/>
+              <a:t> not </a:t>
+            </a:r>
+            <a:r>
+              <a:rPr lang="tr-TR" sz="1800" dirty="0" err="1" smtClean="0"/>
+              <a:t>comprehensive</a:t>
+            </a:r>
+            <a:r>
+              <a:rPr lang="tr-TR" sz="1800" dirty="0" smtClean="0"/>
+              <a:t> </a:t>
+            </a:r>
+            <a:r>
+              <a:rPr lang="tr-TR" sz="1800" dirty="0" err="1" smtClean="0"/>
+              <a:t>enough</a:t>
+            </a:r>
+            <a:r>
+              <a:rPr lang="tr-TR" sz="1800" dirty="0"/>
+              <a:t> </a:t>
+            </a:r>
+            <a:r>
+              <a:rPr lang="tr-TR" sz="1800" dirty="0" smtClean="0"/>
+              <a:t>[1]</a:t>
+            </a:r>
+          </a:p>
+          <a:p>
+            <a:pPr lvl="3">
+              <a:lnSpc>
+                <a:spcPct val="100000"/>
+              </a:lnSpc>
+            </a:pPr>
+            <a:r>
+              <a:rPr lang="tr-TR" sz="1800" dirty="0" err="1" smtClean="0"/>
+              <a:t>Didn’t</a:t>
+            </a:r>
+            <a:r>
+              <a:rPr lang="tr-TR" sz="1800" dirty="0" smtClean="0"/>
+              <a:t> </a:t>
+            </a:r>
+            <a:r>
+              <a:rPr lang="tr-TR" sz="1800" dirty="0" err="1" smtClean="0"/>
+              <a:t>improved</a:t>
+            </a:r>
+            <a:r>
+              <a:rPr lang="tr-TR" sz="1800" dirty="0" smtClean="0"/>
+              <a:t> </a:t>
+            </a:r>
+            <a:r>
+              <a:rPr lang="tr-TR" sz="1800" dirty="0" err="1" smtClean="0"/>
+              <a:t>performance</a:t>
+            </a:r>
+            <a:r>
+              <a:rPr lang="tr-TR" sz="1800" dirty="0" smtClean="0"/>
+              <a:t> </a:t>
+            </a:r>
+            <a:r>
+              <a:rPr lang="tr-TR" sz="1800" dirty="0" err="1" smtClean="0"/>
+              <a:t>for</a:t>
+            </a:r>
+            <a:r>
+              <a:rPr lang="tr-TR" sz="1800" dirty="0" smtClean="0"/>
+              <a:t> </a:t>
+            </a:r>
+            <a:r>
+              <a:rPr lang="tr-TR" sz="1800" dirty="0" err="1" smtClean="0"/>
+              <a:t>now</a:t>
+            </a:r>
+            <a:endParaRPr lang="tr-TR" sz="1800" dirty="0" smtClean="0"/>
           </a:p>
         </p:txBody>
       </p:sp>
     </p:spTree>
     <p:extLst>
       <p:ext uri="{BB962C8B-B14F-4D97-AF65-F5344CB8AC3E}">
-        <p14:creationId xmlns:p14="http://schemas.microsoft.com/office/powerpoint/2010/main" val="3374292231"/>
+        <p14:creationId xmlns:p14="http://schemas.microsoft.com/office/powerpoint/2010/main" val="127786884"/>
       </p:ext>
     </p:extLst>
   </p:cSld>
@@ -4415,13 +5833,7 @@
       </p:grpSpPr>
       <p:sp>
         <p:nvSpPr>
-          <p:cNvPr id="2" name="Title 1">
-            <a:extLst>
-              <a:ext uri="{FF2B5EF4-FFF2-40B4-BE49-F238E27FC236}">
-                <a16:creationId xmlns:a16="http://schemas.microsoft.com/office/drawing/2014/main" id="{369CA4F0-7F76-4DC7-A47D-BD061E0C6AF6}"/>
-              </a:ext>
-            </a:extLst>
-          </p:cNvPr>
+          <p:cNvPr id="2" name="Unvan 1"/>
           <p:cNvSpPr>
             <a:spLocks noGrp="1"/>
           </p:cNvSpPr>
@@ -4434,23 +5846,26 @@
           <a:bodyPr/>
           <a:lstStyle/>
           <a:p>
-            <a:r>
-              <a:rPr lang="en-US" dirty="0" err="1"/>
-              <a:t>Abdullah_part_name</a:t>
-            </a:r>
-            <a:endParaRPr lang="en-US" dirty="0"/>
-          </a:p>
-        </p:txBody>
-      </p:sp>
-      <p:sp>
-        <p:nvSpPr>
-          <p:cNvPr id="3" name="Content Placeholder 2">
-            <a:extLst>
-              <a:ext uri="{FF2B5EF4-FFF2-40B4-BE49-F238E27FC236}">
-                <a16:creationId xmlns:a16="http://schemas.microsoft.com/office/drawing/2014/main" id="{D941672E-CF5C-4625-8693-307F29A99472}"/>
-              </a:ext>
-            </a:extLst>
-          </p:cNvPr>
+            <a:pPr algn="ctr"/>
+            <a:r>
+              <a:rPr lang="tr-TR" b="1" dirty="0" err="1" smtClean="0"/>
+              <a:t>Baseline</a:t>
+            </a:r>
+            <a:r>
+              <a:rPr lang="tr-TR" b="1" dirty="0" smtClean="0"/>
+              <a:t> </a:t>
+            </a:r>
+            <a:r>
+              <a:rPr lang="tr-TR" b="1" dirty="0" err="1" smtClean="0"/>
+              <a:t>System</a:t>
+            </a:r>
+            <a:endParaRPr lang="en-US" b="1" dirty="0"/>
+          </a:p>
+        </p:txBody>
+      </p:sp>
+      <p:sp>
+        <p:nvSpPr>
+          <p:cNvPr id="3" name="İçerik Yer Tutucusu 2"/>
           <p:cNvSpPr>
             <a:spLocks noGrp="1"/>
           </p:cNvSpPr>
@@ -4460,17 +5875,257 @@
         </p:nvSpPr>
         <p:spPr/>
         <p:txBody>
-          <a:bodyPr/>
-          <a:lstStyle/>
-          <a:p>
-            <a:endParaRPr lang="en-US" dirty="0"/>
+          <a:bodyPr>
+            <a:normAutofit/>
+          </a:bodyPr>
+          <a:lstStyle/>
+          <a:p>
+            <a:pPr lvl="1">
+              <a:lnSpc>
+                <a:spcPts val="2880"/>
+              </a:lnSpc>
+            </a:pPr>
+            <a:r>
+              <a:rPr lang="tr-TR" sz="2400" b="1" dirty="0" err="1" smtClean="0"/>
+              <a:t>Cosine</a:t>
+            </a:r>
+            <a:r>
+              <a:rPr lang="tr-TR" sz="2400" b="1" dirty="0" smtClean="0"/>
+              <a:t> </a:t>
+            </a:r>
+            <a:r>
+              <a:rPr lang="tr-TR" sz="2400" b="1" dirty="0" err="1" smtClean="0"/>
+              <a:t>Similarity</a:t>
+            </a:r>
+            <a:endParaRPr lang="tr-TR" sz="2400" b="1" dirty="0" smtClean="0"/>
+          </a:p>
+          <a:p>
+            <a:pPr lvl="2">
+              <a:lnSpc>
+                <a:spcPts val="2880"/>
+              </a:lnSpc>
+            </a:pPr>
+            <a:r>
+              <a:rPr lang="tr-TR" sz="1800" dirty="0" err="1" smtClean="0"/>
+              <a:t>Used</a:t>
+            </a:r>
+            <a:r>
+              <a:rPr lang="tr-TR" sz="1800" dirty="0" smtClean="0"/>
+              <a:t> </a:t>
+            </a:r>
+            <a:r>
+              <a:rPr lang="tr-TR" sz="1800" dirty="0" err="1" smtClean="0"/>
+              <a:t>if</a:t>
+            </a:r>
+            <a:r>
+              <a:rPr lang="tr-TR" sz="1800" dirty="0" smtClean="0"/>
+              <a:t> </a:t>
+            </a:r>
+            <a:r>
+              <a:rPr lang="tr-TR" sz="1800" dirty="0" err="1" smtClean="0"/>
+              <a:t>exact</a:t>
+            </a:r>
+            <a:r>
+              <a:rPr lang="tr-TR" sz="1800" dirty="0" smtClean="0"/>
+              <a:t> </a:t>
+            </a:r>
+            <a:r>
+              <a:rPr lang="tr-TR" sz="1800" dirty="0" err="1" smtClean="0"/>
+              <a:t>match</a:t>
+            </a:r>
+            <a:r>
+              <a:rPr lang="tr-TR" sz="1800" dirty="0" smtClean="0"/>
+              <a:t> </a:t>
+            </a:r>
+            <a:r>
+              <a:rPr lang="tr-TR" sz="1800" dirty="0" err="1" smtClean="0"/>
+              <a:t>fails</a:t>
+            </a:r>
+            <a:endParaRPr lang="tr-TR" sz="1800" dirty="0" smtClean="0"/>
+          </a:p>
+          <a:p>
+            <a:pPr lvl="2">
+              <a:lnSpc>
+                <a:spcPts val="2880"/>
+              </a:lnSpc>
+            </a:pPr>
+            <a:r>
+              <a:rPr lang="tr-TR" sz="1800" dirty="0" err="1" smtClean="0"/>
+              <a:t>Measures</a:t>
+            </a:r>
+            <a:r>
+              <a:rPr lang="tr-TR" sz="1800" dirty="0" smtClean="0"/>
+              <a:t> </a:t>
+            </a:r>
+            <a:r>
+              <a:rPr lang="tr-TR" sz="1800" dirty="0" err="1" smtClean="0"/>
+              <a:t>cosine</a:t>
+            </a:r>
+            <a:r>
+              <a:rPr lang="tr-TR" sz="1800" dirty="0" smtClean="0"/>
+              <a:t> </a:t>
+            </a:r>
+            <a:r>
+              <a:rPr lang="tr-TR" sz="1800" dirty="0" err="1" smtClean="0"/>
+              <a:t>similarity</a:t>
+            </a:r>
+            <a:r>
+              <a:rPr lang="tr-TR" sz="1800" dirty="0" smtClean="0"/>
+              <a:t> of </a:t>
+            </a:r>
+            <a:r>
+              <a:rPr lang="tr-TR" sz="1800" dirty="0" err="1" smtClean="0"/>
+              <a:t>given</a:t>
+            </a:r>
+            <a:r>
+              <a:rPr lang="tr-TR" sz="1800" dirty="0" smtClean="0"/>
+              <a:t> </a:t>
+            </a:r>
+            <a:r>
+              <a:rPr lang="tr-TR" sz="1800" dirty="0" err="1" smtClean="0"/>
+              <a:t>entity</a:t>
+            </a:r>
+            <a:r>
+              <a:rPr lang="tr-TR" sz="1800" dirty="0" smtClean="0"/>
+              <a:t> </a:t>
+            </a:r>
+            <a:r>
+              <a:rPr lang="tr-TR" sz="1800" dirty="0" err="1" smtClean="0"/>
+              <a:t>with</a:t>
+            </a:r>
+            <a:r>
+              <a:rPr lang="tr-TR" sz="1800" dirty="0" smtClean="0"/>
+              <a:t> </a:t>
+            </a:r>
+            <a:r>
+              <a:rPr lang="tr-TR" sz="1800" dirty="0" err="1" smtClean="0"/>
+              <a:t>all</a:t>
+            </a:r>
+            <a:r>
+              <a:rPr lang="tr-TR" sz="1800" dirty="0" smtClean="0"/>
+              <a:t> </a:t>
+            </a:r>
+            <a:r>
+              <a:rPr lang="tr-TR" sz="1800" dirty="0" err="1" smtClean="0"/>
+              <a:t>entities</a:t>
+            </a:r>
+            <a:r>
+              <a:rPr lang="tr-TR" sz="1800" dirty="0" smtClean="0"/>
+              <a:t> in </a:t>
+            </a:r>
+            <a:r>
+              <a:rPr lang="tr-TR" sz="1800" dirty="0" err="1" smtClean="0"/>
+              <a:t>the</a:t>
+            </a:r>
+            <a:r>
+              <a:rPr lang="tr-TR" sz="1800" dirty="0" smtClean="0"/>
+              <a:t> Training set</a:t>
+            </a:r>
+          </a:p>
+          <a:p>
+            <a:pPr lvl="2">
+              <a:lnSpc>
+                <a:spcPts val="2880"/>
+              </a:lnSpc>
+            </a:pPr>
+            <a:r>
+              <a:rPr lang="tr-TR" sz="1800" dirty="0" err="1" smtClean="0"/>
+              <a:t>Binary</a:t>
+            </a:r>
+            <a:r>
+              <a:rPr lang="tr-TR" sz="1800" dirty="0" smtClean="0"/>
+              <a:t> </a:t>
+            </a:r>
+            <a:r>
+              <a:rPr lang="tr-TR" sz="1800" dirty="0" err="1" smtClean="0"/>
+              <a:t>vectors</a:t>
+            </a:r>
+            <a:r>
+              <a:rPr lang="tr-TR" sz="1800" dirty="0" smtClean="0"/>
+              <a:t> of Training set </a:t>
+            </a:r>
+            <a:r>
+              <a:rPr lang="tr-TR" sz="1800" dirty="0" err="1" smtClean="0"/>
+              <a:t>vocabulary</a:t>
+            </a:r>
+            <a:r>
+              <a:rPr lang="tr-TR" sz="1800" dirty="0" smtClean="0"/>
+              <a:t> size</a:t>
+            </a:r>
+          </a:p>
+          <a:p>
+            <a:pPr lvl="2">
+              <a:lnSpc>
+                <a:spcPts val="2880"/>
+              </a:lnSpc>
+            </a:pPr>
+            <a:r>
+              <a:rPr lang="tr-TR" sz="1800" dirty="0" err="1" smtClean="0"/>
+              <a:t>Improves</a:t>
+            </a:r>
+            <a:r>
+              <a:rPr lang="tr-TR" sz="1800" dirty="0" smtClean="0"/>
+              <a:t> </a:t>
+            </a:r>
+            <a:r>
+              <a:rPr lang="tr-TR" sz="1800" dirty="0" err="1" smtClean="0"/>
+              <a:t>performance</a:t>
+            </a:r>
+            <a:r>
+              <a:rPr lang="tr-TR" sz="1800" dirty="0" smtClean="0"/>
+              <a:t> </a:t>
+            </a:r>
+            <a:r>
+              <a:rPr lang="tr-TR" sz="1800" dirty="0" err="1" smtClean="0"/>
+              <a:t>by</a:t>
+            </a:r>
+            <a:r>
+              <a:rPr lang="tr-TR" sz="1800" dirty="0" smtClean="0"/>
+              <a:t> 10%</a:t>
+            </a:r>
+          </a:p>
+          <a:p>
+            <a:pPr lvl="2">
+              <a:lnSpc>
+                <a:spcPts val="2880"/>
+              </a:lnSpc>
+            </a:pPr>
+            <a:r>
+              <a:rPr lang="tr-TR" sz="1800" b="1" dirty="0" err="1" smtClean="0"/>
+              <a:t>Performance</a:t>
+            </a:r>
+            <a:r>
+              <a:rPr lang="tr-TR" sz="1800" b="1" dirty="0" smtClean="0"/>
+              <a:t>: </a:t>
+            </a:r>
+            <a:r>
+              <a:rPr lang="tr-TR" sz="1800" dirty="0" smtClean="0"/>
+              <a:t>47% </a:t>
+            </a:r>
+            <a:r>
+              <a:rPr lang="tr-TR" sz="1800" dirty="0" err="1" smtClean="0"/>
+              <a:t>correct</a:t>
+            </a:r>
+            <a:r>
+              <a:rPr lang="tr-TR" sz="1800" dirty="0" smtClean="0"/>
+              <a:t> </a:t>
+            </a:r>
+            <a:r>
+              <a:rPr lang="tr-TR" sz="1800" dirty="0" err="1" smtClean="0"/>
+              <a:t>normalization</a:t>
+            </a:r>
+            <a:r>
+              <a:rPr lang="tr-TR" sz="1800" dirty="0" smtClean="0"/>
+              <a:t> on dev set.</a:t>
+            </a:r>
+            <a:endParaRPr lang="en-US" sz="1800" b="1" dirty="0"/>
           </a:p>
         </p:txBody>
       </p:sp>
     </p:spTree>
     <p:extLst>
       <p:ext uri="{BB962C8B-B14F-4D97-AF65-F5344CB8AC3E}">
-        <p14:creationId xmlns:p14="http://schemas.microsoft.com/office/powerpoint/2010/main" val="2269900708"/>
+        <p14:creationId xmlns:p14="http://schemas.microsoft.com/office/powerpoint/2010/main" val="4161970495"/>
       </p:ext>
     </p:extLst>
   </p:cSld>
@@ -4502,7 +6157,7 @@
           <p:cNvPr id="2" name="Title 1">
             <a:extLst>
               <a:ext uri="{FF2B5EF4-FFF2-40B4-BE49-F238E27FC236}">
-                <a16:creationId xmlns:a16="http://schemas.microsoft.com/office/drawing/2014/main" id="{1AE67C95-A1CD-44F8-99D2-4640264C88CA}"/>
+                <a16:creationId xmlns:a16="http://schemas.microsoft.com/office/drawing/2014/main" id="{369CA4F0-7F76-4DC7-A47D-BD061E0C6AF6}"/>
               </a:ext>
             </a:extLst>
           </p:cNvPr>
@@ -4519,9 +6174,10 @@
           <a:lstStyle/>
           <a:p>
             <a:r>
-              <a:rPr lang="en-US" dirty="0"/>
-              <a:t>Future Work</a:t>
-            </a:r>
+              <a:rPr lang="en-US" dirty="0" err="1"/>
+              <a:t>Abdullah_part_name</a:t>
+            </a:r>
+            <a:endParaRPr lang="en-US" dirty="0"/>
           </a:p>
         </p:txBody>
       </p:sp>
@@ -4530,7 +6186,7 @@
           <p:cNvPr id="3" name="Content Placeholder 2">
             <a:extLst>
               <a:ext uri="{FF2B5EF4-FFF2-40B4-BE49-F238E27FC236}">
-                <a16:creationId xmlns:a16="http://schemas.microsoft.com/office/drawing/2014/main" id="{3B9B51B1-383B-4A8B-9C5B-9FD704B0BC1B}"/>
+                <a16:creationId xmlns:a16="http://schemas.microsoft.com/office/drawing/2014/main" id="{D941672E-CF5C-4625-8693-307F29A99472}"/>
               </a:ext>
             </a:extLst>
           </p:cNvPr>
@@ -4546,29 +6202,14 @@
           <a:bodyPr/>
           <a:lstStyle/>
           <a:p>
-            <a:r>
-              <a:rPr lang="en-US" dirty="0"/>
-              <a:t>Paper 1</a:t>
-            </a:r>
-          </a:p>
-          <a:p>
-            <a:r>
-              <a:rPr lang="en-US" dirty="0"/>
-              <a:t>Paper 2</a:t>
-            </a:r>
-          </a:p>
-          <a:p>
-            <a:r>
-              <a:rPr lang="en-US" dirty="0"/>
-              <a:t>Paper 3</a:t>
-            </a:r>
+            <a:endParaRPr lang="en-US" dirty="0"/>
           </a:p>
         </p:txBody>
       </p:sp>
     </p:spTree>
     <p:extLst>
       <p:ext uri="{BB962C8B-B14F-4D97-AF65-F5344CB8AC3E}">
-        <p14:creationId xmlns:p14="http://schemas.microsoft.com/office/powerpoint/2010/main" val="2168468946"/>
+        <p14:creationId xmlns:p14="http://schemas.microsoft.com/office/powerpoint/2010/main" val="3374292231"/>
       </p:ext>
     </p:extLst>
   </p:cSld>
@@ -4600,7 +6241,7 @@
           <p:cNvPr id="2" name="Title 1">
             <a:extLst>
               <a:ext uri="{FF2B5EF4-FFF2-40B4-BE49-F238E27FC236}">
-                <a16:creationId xmlns:a16="http://schemas.microsoft.com/office/drawing/2014/main" id="{1AE67C95-A1CD-44F8-99D2-4640264C88CA}"/>
+                <a16:creationId xmlns:a16="http://schemas.microsoft.com/office/drawing/2014/main" id="{369CA4F0-7F76-4DC7-A47D-BD061E0C6AF6}"/>
               </a:ext>
             </a:extLst>
           </p:cNvPr>
@@ -4617,9 +6258,10 @@
           <a:lstStyle/>
           <a:p>
             <a:r>
-              <a:rPr lang="en-US" dirty="0"/>
-              <a:t>Paper 1</a:t>
-            </a:r>
+              <a:rPr lang="en-US" dirty="0" err="1"/>
+              <a:t>Abdullah_part_name</a:t>
+            </a:r>
+            <a:endParaRPr lang="en-US" dirty="0"/>
           </a:p>
         </p:txBody>
       </p:sp>
@@ -4628,7 +6270,7 @@
           <p:cNvPr id="3" name="Content Placeholder 2">
             <a:extLst>
               <a:ext uri="{FF2B5EF4-FFF2-40B4-BE49-F238E27FC236}">
-                <a16:creationId xmlns:a16="http://schemas.microsoft.com/office/drawing/2014/main" id="{3B9B51B1-383B-4A8B-9C5B-9FD704B0BC1B}"/>
+                <a16:creationId xmlns:a16="http://schemas.microsoft.com/office/drawing/2014/main" id="{D941672E-CF5C-4625-8693-307F29A99472}"/>
               </a:ext>
             </a:extLst>
           </p:cNvPr>
@@ -4651,7 +6293,7 @@
     </p:spTree>
     <p:extLst>
       <p:ext uri="{BB962C8B-B14F-4D97-AF65-F5344CB8AC3E}">
-        <p14:creationId xmlns:p14="http://schemas.microsoft.com/office/powerpoint/2010/main" val="1452545530"/>
+        <p14:creationId xmlns:p14="http://schemas.microsoft.com/office/powerpoint/2010/main" val="2269900708"/>
       </p:ext>
     </p:extLst>
   </p:cSld>
@@ -4701,7 +6343,7 @@
           <a:p>
             <a:r>
               <a:rPr lang="en-US" dirty="0"/>
-              <a:t>Paper 2</a:t>
+              <a:t>Future Work</a:t>
             </a:r>
           </a:p>
         </p:txBody>
@@ -4727,14 +6369,29 @@
           <a:bodyPr/>
           <a:lstStyle/>
           <a:p>
-            <a:endParaRPr lang="en-US" dirty="0"/>
+            <a:r>
+              <a:rPr lang="en-US" dirty="0"/>
+              <a:t>Paper 1</a:t>
+            </a:r>
+          </a:p>
+          <a:p>
+            <a:r>
+              <a:rPr lang="en-US" dirty="0"/>
+              <a:t>Paper 2</a:t>
+            </a:r>
+          </a:p>
+          <a:p>
+            <a:r>
+              <a:rPr lang="en-US" dirty="0"/>
+              <a:t>Paper 3</a:t>
+            </a:r>
           </a:p>
         </p:txBody>
       </p:sp>
     </p:spTree>
     <p:extLst>
       <p:ext uri="{BB962C8B-B14F-4D97-AF65-F5344CB8AC3E}">
-        <p14:creationId xmlns:p14="http://schemas.microsoft.com/office/powerpoint/2010/main" val="3961645006"/>
+        <p14:creationId xmlns:p14="http://schemas.microsoft.com/office/powerpoint/2010/main" val="2168468946"/>
       </p:ext>
     </p:extLst>
   </p:cSld>

</xml_diff>